<commit_message>
fixed some layout issues with missing slide numbers
</commit_message>
<xml_diff>
--- a/robprak1516-presentation.pptx
+++ b/robprak1516-presentation.pptx
@@ -1,6 +1,6 @@
 
 <file path=ppt/presentation.xml><?xml version="1.0" encoding="utf-8"?>
-<p:presentation xmlns:a="http://schemas.openxmlformats.org/drawingml/2006/main" xmlns:r="http://schemas.openxmlformats.org/officeDocument/2006/relationships" xmlns:p="http://schemas.openxmlformats.org/presentationml/2006/main" showSpecialPlsOnTitleSld="0" saveSubsetFonts="1">
+<p:presentation xmlns:a="http://schemas.openxmlformats.org/drawingml/2006/main" xmlns:r="http://schemas.openxmlformats.org/officeDocument/2006/relationships" xmlns:p="http://schemas.openxmlformats.org/presentationml/2006/main" firstSlideNum="0" showSpecialPlsOnTitleSld="0" saveSubsetFonts="1">
   <p:sldMasterIdLst>
     <p:sldMasterId id="2147483648" r:id="rId1"/>
   </p:sldMasterIdLst>
@@ -16,12 +16,12 @@
     <p:sldId id="264" r:id="rId7"/>
     <p:sldId id="292" r:id="rId8"/>
     <p:sldId id="293" r:id="rId9"/>
-    <p:sldId id="294" r:id="rId10"/>
+    <p:sldId id="303" r:id="rId10"/>
     <p:sldId id="295" r:id="rId11"/>
-    <p:sldId id="296" r:id="rId12"/>
+    <p:sldId id="302" r:id="rId12"/>
     <p:sldId id="286" r:id="rId13"/>
-    <p:sldId id="298" r:id="rId14"/>
-    <p:sldId id="299" r:id="rId15"/>
+    <p:sldId id="300" r:id="rId14"/>
+    <p:sldId id="301" r:id="rId15"/>
     <p:sldId id="277" r:id="rId16"/>
     <p:sldId id="265" r:id="rId17"/>
     <p:sldId id="266" r:id="rId18"/>
@@ -564,7 +564,7 @@
           <a:p>
             <a:fld id="{EC5D6A57-0462-4896-8270-C647D8407408}" type="slidenum">
               <a:rPr lang="de-DE" smtClean="0"/>
-              <a:t>3</a:t>
+              <a:t>2</a:t>
             </a:fld>
             <a:endParaRPr lang="de-DE"/>
           </a:p>
@@ -648,7 +648,7 @@
           <a:p>
             <a:fld id="{EC5D6A57-0462-4896-8270-C647D8407408}" type="slidenum">
               <a:rPr lang="de-DE" smtClean="0"/>
-              <a:t>30</a:t>
+              <a:t>29</a:t>
             </a:fld>
             <a:endParaRPr lang="de-DE"/>
           </a:p>
@@ -736,7 +736,7 @@
           <a:p>
             <a:fld id="{EC5D6A57-0462-4896-8270-C647D8407408}" type="slidenum">
               <a:rPr lang="de-DE" smtClean="0"/>
-              <a:t>31</a:t>
+              <a:t>30</a:t>
             </a:fld>
             <a:endParaRPr lang="de-DE"/>
           </a:p>
@@ -858,7 +858,7 @@
           <a:p>
             <a:fld id="{EC5D6A57-0462-4896-8270-C647D8407408}" type="slidenum">
               <a:rPr lang="de-DE" smtClean="0"/>
-              <a:t>20</a:t>
+              <a:t>19</a:t>
             </a:fld>
             <a:endParaRPr lang="de-DE"/>
           </a:p>
@@ -954,7 +954,7 @@
           <a:p>
             <a:fld id="{EC5D6A57-0462-4896-8270-C647D8407408}" type="slidenum">
               <a:rPr lang="de-DE" smtClean="0"/>
-              <a:t>21</a:t>
+              <a:t>20</a:t>
             </a:fld>
             <a:endParaRPr lang="de-DE"/>
           </a:p>
@@ -1060,7 +1060,7 @@
           <a:p>
             <a:fld id="{EC5D6A57-0462-4896-8270-C647D8407408}" type="slidenum">
               <a:rPr lang="de-DE" smtClean="0"/>
-              <a:t>22</a:t>
+              <a:t>21</a:t>
             </a:fld>
             <a:endParaRPr lang="de-DE"/>
           </a:p>
@@ -1173,7 +1173,7 @@
           <a:p>
             <a:fld id="{EC5D6A57-0462-4896-8270-C647D8407408}" type="slidenum">
               <a:rPr lang="de-DE" smtClean="0"/>
-              <a:t>23</a:t>
+              <a:t>22</a:t>
             </a:fld>
             <a:endParaRPr lang="de-DE"/>
           </a:p>
@@ -1277,7 +1277,7 @@
           <a:p>
             <a:fld id="{EC5D6A57-0462-4896-8270-C647D8407408}" type="slidenum">
               <a:rPr lang="de-DE" smtClean="0"/>
-              <a:t>24</a:t>
+              <a:t>23</a:t>
             </a:fld>
             <a:endParaRPr lang="de-DE"/>
           </a:p>
@@ -1380,7 +1380,7 @@
           <a:p>
             <a:fld id="{EC5D6A57-0462-4896-8270-C647D8407408}" type="slidenum">
               <a:rPr lang="de-DE" smtClean="0"/>
-              <a:t>25</a:t>
+              <a:t>24</a:t>
             </a:fld>
             <a:endParaRPr lang="de-DE"/>
           </a:p>
@@ -1478,7 +1478,7 @@
           <a:p>
             <a:fld id="{EC5D6A57-0462-4896-8270-C647D8407408}" type="slidenum">
               <a:rPr lang="de-DE" smtClean="0"/>
-              <a:t>26</a:t>
+              <a:t>25</a:t>
             </a:fld>
             <a:endParaRPr lang="de-DE"/>
           </a:p>
@@ -1593,7 +1593,7 @@
           <a:p>
             <a:fld id="{EC5D6A57-0462-4896-8270-C647D8407408}" type="slidenum">
               <a:rPr lang="de-DE" smtClean="0"/>
-              <a:t>27</a:t>
+              <a:t>26</a:t>
             </a:fld>
             <a:endParaRPr lang="de-DE"/>
           </a:p>
@@ -2292,12 +2292,12 @@
       </p:sp>
       <p:sp>
         <p:nvSpPr>
-          <p:cNvPr id="6" name="Foliennummernplatzhalter 5"/>
+          <p:cNvPr id="7" name="Foliennummernplatzhalter 5"/>
           <p:cNvSpPr>
             <a:spLocks noGrp="1"/>
           </p:cNvSpPr>
           <p:nvPr>
-            <p:ph type="sldNum" sz="quarter" idx="12"/>
+            <p:ph type="sldNum" sz="quarter" idx="4"/>
           </p:nvPr>
         </p:nvSpPr>
         <p:spPr>
@@ -2323,7 +2323,7 @@
             </a:lvl1pPr>
           </a:lstStyle>
           <a:p>
-            <a:fld id="{88051181-3DEF-484A-8434-F25831745C76}" type="slidenum">
+            <a:fld id="{5F169D08-9325-4915-9F9B-D4854A2E2446}" type="slidenum">
               <a:rPr lang="de-DE" smtClean="0"/>
               <a:pPr/>
               <a:t>‹Nr.›</a:t>
@@ -2406,18 +2406,18 @@
       </p:sp>
       <p:sp>
         <p:nvSpPr>
-          <p:cNvPr id="5" name="Foliennummernplatzhalter 4"/>
+          <p:cNvPr id="6" name="Foliennummernplatzhalter 5"/>
           <p:cNvSpPr>
             <a:spLocks noGrp="1"/>
           </p:cNvSpPr>
           <p:nvPr>
-            <p:ph type="sldNum" sz="quarter" idx="12"/>
+            <p:ph type="sldNum" sz="quarter" idx="4"/>
           </p:nvPr>
         </p:nvSpPr>
         <p:spPr>
           <a:xfrm>
-            <a:off x="11769212" y="6459794"/>
-            <a:ext cx="422787" cy="398206"/>
+            <a:off x="11779044" y="6459794"/>
+            <a:ext cx="412956" cy="398206"/>
           </a:xfrm>
           <a:prstGeom prst="rect">
             <a:avLst/>
@@ -2427,7 +2427,7 @@
           <a:bodyPr anchor="ctr" anchorCtr="0"/>
           <a:lstStyle>
             <a:lvl1pPr>
-              <a:defRPr lang="de-DE" sz="900" smtClean="0">
+              <a:defRPr sz="900">
                 <a:solidFill>
                   <a:srgbClr val="868889"/>
                 </a:solidFill>
@@ -2437,7 +2437,7 @@
             </a:lvl1pPr>
           </a:lstStyle>
           <a:p>
-            <a:fld id="{88051181-3DEF-484A-8434-F25831745C76}" type="slidenum">
+            <a:fld id="{5F169D08-9325-4915-9F9B-D4854A2E2446}" type="slidenum">
               <a:rPr lang="de-DE" smtClean="0"/>
               <a:pPr/>
               <a:t>‹Nr.›</a:t>
@@ -2476,6 +2476,48 @@
           <a:chExt cx="0" cy="0"/>
         </a:xfrm>
       </p:grpSpPr>
+      <p:sp>
+        <p:nvSpPr>
+          <p:cNvPr id="3" name="Foliennummernplatzhalter 5"/>
+          <p:cNvSpPr>
+            <a:spLocks noGrp="1"/>
+          </p:cNvSpPr>
+          <p:nvPr>
+            <p:ph type="sldNum" sz="quarter" idx="4"/>
+          </p:nvPr>
+        </p:nvSpPr>
+        <p:spPr>
+          <a:xfrm>
+            <a:off x="11779044" y="6459794"/>
+            <a:ext cx="412956" cy="398206"/>
+          </a:xfrm>
+          <a:prstGeom prst="rect">
+            <a:avLst/>
+          </a:prstGeom>
+        </p:spPr>
+        <p:txBody>
+          <a:bodyPr anchor="ctr" anchorCtr="0"/>
+          <a:lstStyle>
+            <a:lvl1pPr>
+              <a:defRPr sz="900">
+                <a:solidFill>
+                  <a:srgbClr val="868889"/>
+                </a:solidFill>
+                <a:latin typeface="Arial" panose="020B0604020202020204" pitchFamily="34" charset="0"/>
+                <a:cs typeface="Arial" panose="020B0604020202020204" pitchFamily="34" charset="0"/>
+              </a:defRPr>
+            </a:lvl1pPr>
+          </a:lstStyle>
+          <a:p>
+            <a:fld id="{5F169D08-9325-4915-9F9B-D4854A2E2446}" type="slidenum">
+              <a:rPr lang="de-DE" smtClean="0"/>
+              <a:pPr/>
+              <a:t>‹Nr.›</a:t>
+            </a:fld>
+            <a:endParaRPr lang="de-DE" dirty="0"/>
+          </a:p>
+        </p:txBody>
+      </p:sp>
     </p:spTree>
     <p:extLst>
       <p:ext uri="{BB962C8B-B14F-4D97-AF65-F5344CB8AC3E}">
@@ -3537,7 +3579,7 @@
                 </a:solidFill>
                 <a:latin typeface="Arial"/>
               </a:rPr>
-              <a:t>10</a:t>
+              <a:t>9</a:t>
             </a:fld>
             <a:endParaRPr/>
           </a:p>
@@ -3641,19 +3683,19 @@
           <a:lstStyle/>
           <a:p>
             <a:r>
-              <a:rPr lang="de-DE" dirty="0" smtClean="0"/>
+              <a:rPr lang="de-DE" dirty="0"/>
               <a:t>Die Implementierung besitzt die zwei ROS Nodes </a:t>
             </a:r>
             <a:r>
-              <a:rPr lang="de-DE" dirty="0" err="1" smtClean="0"/>
+              <a:rPr lang="de-DE" dirty="0" err="1"/>
               <a:t>Marker_Broadcaster</a:t>
             </a:r>
             <a:r>
-              <a:rPr lang="de-DE" dirty="0" smtClean="0"/>
+              <a:rPr lang="de-DE" dirty="0"/>
               <a:t> und </a:t>
             </a:r>
             <a:r>
-              <a:rPr lang="de-DE" dirty="0" err="1" smtClean="0"/>
+              <a:rPr lang="de-DE" dirty="0" err="1"/>
               <a:t>Localizer</a:t>
             </a:r>
             <a:endParaRPr lang="de-DE" dirty="0"/>
@@ -3662,7 +3704,31 @@
       </p:sp>
       <p:sp>
         <p:nvSpPr>
-          <p:cNvPr id="3" name="Rectangle 8"/>
+          <p:cNvPr id="3" name="Foliennummernplatzhalter 2"/>
+          <p:cNvSpPr>
+            <a:spLocks noGrp="1"/>
+          </p:cNvSpPr>
+          <p:nvPr>
+            <p:ph type="sldNum" sz="quarter" idx="4"/>
+          </p:nvPr>
+        </p:nvSpPr>
+        <p:spPr/>
+        <p:txBody>
+          <a:bodyPr/>
+          <a:lstStyle/>
+          <a:p>
+            <a:fld id="{5F169D08-9325-4915-9F9B-D4854A2E2446}" type="slidenum">
+              <a:rPr lang="de-DE" smtClean="0"/>
+              <a:pPr/>
+              <a:t>10</a:t>
+            </a:fld>
+            <a:endParaRPr lang="de-DE" dirty="0"/>
+          </a:p>
+        </p:txBody>
+      </p:sp>
+      <p:sp>
+        <p:nvSpPr>
+          <p:cNvPr id="4" name="Rectangle 8"/>
           <p:cNvSpPr>
             <a:spLocks noChangeArrowheads="1"/>
           </p:cNvSpPr>
@@ -3882,7 +3948,7 @@
       </p:sp>
       <p:sp>
         <p:nvSpPr>
-          <p:cNvPr id="4" name="Rectangle 11"/>
+          <p:cNvPr id="5" name="Rectangle 11"/>
           <p:cNvSpPr>
             <a:spLocks noChangeArrowheads="1"/>
           </p:cNvSpPr>
@@ -4070,7 +4136,7 @@
       </p:sp>
       <p:sp>
         <p:nvSpPr>
-          <p:cNvPr id="5" name="Rectangle 8"/>
+          <p:cNvPr id="6" name="Rectangle 8"/>
           <p:cNvSpPr>
             <a:spLocks noChangeArrowheads="1"/>
           </p:cNvSpPr>
@@ -4422,7 +4488,7 @@
       </p:sp>
       <p:sp>
         <p:nvSpPr>
-          <p:cNvPr id="6" name="Rectangle 11"/>
+          <p:cNvPr id="7" name="Rectangle 11"/>
           <p:cNvSpPr>
             <a:spLocks noChangeArrowheads="1"/>
           </p:cNvSpPr>
@@ -4603,20 +4669,13 @@
     </p:spTree>
     <p:extLst>
       <p:ext uri="{BB962C8B-B14F-4D97-AF65-F5344CB8AC3E}">
-        <p14:creationId xmlns:p14="http://schemas.microsoft.com/office/powerpoint/2010/main" val="161524888"/>
+        <p14:creationId xmlns:p14="http://schemas.microsoft.com/office/powerpoint/2010/main" val="1941116140"/>
       </p:ext>
     </p:extLst>
   </p:cSld>
   <p:clrMapOvr>
     <a:masterClrMapping/>
   </p:clrMapOvr>
-  <p:timing>
-    <p:tnLst>
-      <p:par>
-        <p:cTn id="1" dur="indefinite" restart="never" nodeType="tmRoot"/>
-      </p:par>
-    </p:tnLst>
-  </p:timing>
 </p:sld>
 </file>
 
@@ -4713,7 +4772,7 @@
                 </a:solidFill>
                 <a:latin typeface="Arial"/>
               </a:rPr>
-              <a:t>12</a:t>
+              <a:t>11</a:t>
             </a:fld>
             <a:endParaRPr/>
           </a:p>
@@ -4803,7 +4862,7 @@
       </p:grpSpPr>
       <p:sp>
         <p:nvSpPr>
-          <p:cNvPr id="2" name="Titel 1"/>
+          <p:cNvPr id="3" name="Titel 2"/>
           <p:cNvSpPr>
             <a:spLocks noGrp="1"/>
           </p:cNvSpPr>
@@ -4817,16 +4876,39 @@
           <a:lstStyle/>
           <a:p>
             <a:r>
-              <a:rPr lang="de-DE" dirty="0" smtClean="0"/>
+              <a:rPr lang="de-DE" dirty="0"/>
               <a:t>Während der Umsetzung wurden die folgenden Probleme gelöst</a:t>
             </a:r>
+          </a:p>
+        </p:txBody>
+      </p:sp>
+      <p:sp>
+        <p:nvSpPr>
+          <p:cNvPr id="2" name="Foliennummernplatzhalter 1"/>
+          <p:cNvSpPr>
+            <a:spLocks noGrp="1"/>
+          </p:cNvSpPr>
+          <p:nvPr>
+            <p:ph type="sldNum" sz="quarter" idx="4"/>
+          </p:nvPr>
+        </p:nvSpPr>
+        <p:spPr/>
+        <p:txBody>
+          <a:bodyPr/>
+          <a:lstStyle/>
+          <a:p>
+            <a:fld id="{5F169D08-9325-4915-9F9B-D4854A2E2446}" type="slidenum">
+              <a:rPr lang="de-DE" smtClean="0"/>
+              <a:pPr/>
+              <a:t>12</a:t>
+            </a:fld>
             <a:endParaRPr lang="de-DE" dirty="0"/>
           </a:p>
         </p:txBody>
       </p:sp>
       <p:sp>
         <p:nvSpPr>
-          <p:cNvPr id="16" name="Rectangle 3"/>
+          <p:cNvPr id="4" name="Rectangle 3"/>
           <p:cNvSpPr>
             <a:spLocks noChangeArrowheads="1"/>
           </p:cNvSpPr>
@@ -5003,7 +5085,7 @@
       </p:sp>
       <p:sp>
         <p:nvSpPr>
-          <p:cNvPr id="17" name="Rectangle 4"/>
+          <p:cNvPr id="5" name="Rectangle 4"/>
           <p:cNvSpPr>
             <a:spLocks noChangeArrowheads="1"/>
           </p:cNvSpPr>
@@ -5178,7 +5260,7 @@
       </p:sp>
       <p:sp>
         <p:nvSpPr>
-          <p:cNvPr id="18" name="Rectangle 5"/>
+          <p:cNvPr id="6" name="Rectangle 5"/>
           <p:cNvSpPr>
             <a:spLocks noChangeArrowheads="1"/>
           </p:cNvSpPr>
@@ -5353,7 +5435,7 @@
       </p:sp>
       <p:sp>
         <p:nvSpPr>
-          <p:cNvPr id="19" name="Rectangle 6"/>
+          <p:cNvPr id="7" name="Rectangle 6"/>
           <p:cNvSpPr>
             <a:spLocks noChangeArrowheads="1"/>
           </p:cNvSpPr>
@@ -5528,7 +5610,7 @@
       </p:sp>
       <p:sp>
         <p:nvSpPr>
-          <p:cNvPr id="21" name="AutoShape 8"/>
+          <p:cNvPr id="8" name="AutoShape 8"/>
           <p:cNvSpPr>
             <a:spLocks noChangeArrowheads="1"/>
           </p:cNvSpPr>
@@ -5738,7 +5820,7 @@
       </p:sp>
       <p:sp>
         <p:nvSpPr>
-          <p:cNvPr id="22" name="AutoShape 9"/>
+          <p:cNvPr id="9" name="AutoShape 9"/>
           <p:cNvSpPr>
             <a:spLocks noChangeArrowheads="1"/>
           </p:cNvSpPr>
@@ -5946,7 +6028,7 @@
       </p:sp>
       <p:sp>
         <p:nvSpPr>
-          <p:cNvPr id="23" name="AutoShape 10"/>
+          <p:cNvPr id="10" name="AutoShape 10"/>
           <p:cNvSpPr>
             <a:spLocks noChangeArrowheads="1"/>
           </p:cNvSpPr>
@@ -6136,7 +6218,7 @@
       </p:sp>
       <p:sp>
         <p:nvSpPr>
-          <p:cNvPr id="24" name="AutoShape 11"/>
+          <p:cNvPr id="11" name="AutoShape 11"/>
           <p:cNvSpPr>
             <a:spLocks noChangeArrowheads="1"/>
           </p:cNvSpPr>
@@ -6331,20 +6413,13 @@
     </p:spTree>
     <p:extLst>
       <p:ext uri="{BB962C8B-B14F-4D97-AF65-F5344CB8AC3E}">
-        <p14:creationId xmlns:p14="http://schemas.microsoft.com/office/powerpoint/2010/main" val="2368909247"/>
+        <p14:creationId xmlns:p14="http://schemas.microsoft.com/office/powerpoint/2010/main" val="2160020800"/>
       </p:ext>
     </p:extLst>
   </p:cSld>
   <p:clrMapOvr>
     <a:masterClrMapping/>
   </p:clrMapOvr>
-  <p:timing>
-    <p:tnLst>
-      <p:par>
-        <p:cTn id="1" dur="indefinite" restart="never" nodeType="tmRoot"/>
-      </p:par>
-    </p:tnLst>
-  </p:timing>
 </p:sld>
 </file>
 
@@ -6367,7 +6442,53 @@
       </p:grpSpPr>
       <p:sp>
         <p:nvSpPr>
-          <p:cNvPr id="2" name="Rectangle 3"/>
+          <p:cNvPr id="2" name="Titel 1"/>
+          <p:cNvSpPr>
+            <a:spLocks noGrp="1"/>
+          </p:cNvSpPr>
+          <p:nvPr>
+            <p:ph type="title"/>
+          </p:nvPr>
+        </p:nvSpPr>
+        <p:spPr/>
+        <p:txBody>
+          <a:bodyPr/>
+          <a:lstStyle/>
+          <a:p>
+            <a:r>
+              <a:rPr lang="de-DE" dirty="0"/>
+              <a:t>Folgende Tests wurden durchgeführt um die Ergebnisse zu überprüfen</a:t>
+            </a:r>
+          </a:p>
+        </p:txBody>
+      </p:sp>
+      <p:sp>
+        <p:nvSpPr>
+          <p:cNvPr id="3" name="Foliennummernplatzhalter 2"/>
+          <p:cNvSpPr>
+            <a:spLocks noGrp="1"/>
+          </p:cNvSpPr>
+          <p:nvPr>
+            <p:ph type="sldNum" sz="quarter" idx="4"/>
+          </p:nvPr>
+        </p:nvSpPr>
+        <p:spPr/>
+        <p:txBody>
+          <a:bodyPr/>
+          <a:lstStyle/>
+          <a:p>
+            <a:fld id="{5F169D08-9325-4915-9F9B-D4854A2E2446}" type="slidenum">
+              <a:rPr lang="de-DE" smtClean="0"/>
+              <a:pPr/>
+              <a:t>13</a:t>
+            </a:fld>
+            <a:endParaRPr lang="de-DE" dirty="0"/>
+          </a:p>
+        </p:txBody>
+      </p:sp>
+      <p:sp>
+        <p:nvSpPr>
+          <p:cNvPr id="4" name="Rectangle 3"/>
           <p:cNvSpPr>
             <a:spLocks noChangeArrowheads="1"/>
           </p:cNvSpPr>
@@ -6544,7 +6665,7 @@
       </p:sp>
       <p:sp>
         <p:nvSpPr>
-          <p:cNvPr id="3" name="Rectangle 4"/>
+          <p:cNvPr id="5" name="Rectangle 4"/>
           <p:cNvSpPr>
             <a:spLocks noChangeArrowheads="1"/>
           </p:cNvSpPr>
@@ -6719,7 +6840,7 @@
       </p:sp>
       <p:sp>
         <p:nvSpPr>
-          <p:cNvPr id="4" name="Rectangle 5"/>
+          <p:cNvPr id="6" name="Rectangle 5"/>
           <p:cNvSpPr>
             <a:spLocks noChangeArrowheads="1"/>
           </p:cNvSpPr>
@@ -6894,7 +7015,7 @@
       </p:sp>
       <p:sp>
         <p:nvSpPr>
-          <p:cNvPr id="5" name="AutoShape 8"/>
+          <p:cNvPr id="7" name="AutoShape 8"/>
           <p:cNvSpPr>
             <a:spLocks noChangeArrowheads="1"/>
           </p:cNvSpPr>
@@ -7078,7 +7199,7 @@
       </p:sp>
       <p:sp>
         <p:nvSpPr>
-          <p:cNvPr id="6" name="AutoShape 9"/>
+          <p:cNvPr id="8" name="AutoShape 9"/>
           <p:cNvSpPr>
             <a:spLocks noChangeArrowheads="1"/>
           </p:cNvSpPr>
@@ -7262,7 +7383,7 @@
       </p:sp>
       <p:sp>
         <p:nvSpPr>
-          <p:cNvPr id="7" name="AutoShape 10"/>
+          <p:cNvPr id="9" name="AutoShape 10"/>
           <p:cNvSpPr>
             <a:spLocks noChangeArrowheads="1"/>
           </p:cNvSpPr>
@@ -7444,46 +7565,16 @@
           </a:p>
         </p:txBody>
       </p:sp>
-      <p:sp>
-        <p:nvSpPr>
-          <p:cNvPr id="8" name="Titel 7"/>
-          <p:cNvSpPr>
-            <a:spLocks noGrp="1"/>
-          </p:cNvSpPr>
-          <p:nvPr>
-            <p:ph type="title"/>
-          </p:nvPr>
-        </p:nvSpPr>
-        <p:spPr/>
-        <p:txBody>
-          <a:bodyPr/>
-          <a:lstStyle/>
-          <a:p>
-            <a:r>
-              <a:rPr lang="de-DE" dirty="0" smtClean="0"/>
-              <a:t>Folgende Tests wurden durchgeführt um die Ergebnisse zu überprüfen</a:t>
-            </a:r>
-            <a:endParaRPr lang="de-DE" dirty="0"/>
-          </a:p>
-        </p:txBody>
-      </p:sp>
     </p:spTree>
     <p:extLst>
       <p:ext uri="{BB962C8B-B14F-4D97-AF65-F5344CB8AC3E}">
-        <p14:creationId xmlns:p14="http://schemas.microsoft.com/office/powerpoint/2010/main" val="748851910"/>
+        <p14:creationId xmlns:p14="http://schemas.microsoft.com/office/powerpoint/2010/main" val="1364519035"/>
       </p:ext>
     </p:extLst>
   </p:cSld>
   <p:clrMapOvr>
     <a:masterClrMapping/>
   </p:clrMapOvr>
-  <p:timing>
-    <p:tnLst>
-      <p:par>
-        <p:cTn id="1" dur="indefinite" restart="never" nodeType="tmRoot"/>
-      </p:par>
-    </p:tnLst>
-  </p:timing>
 </p:sld>
 </file>
 
@@ -7534,17 +7625,25 @@
             <a:spLocks noGrp="1"/>
           </p:cNvSpPr>
           <p:nvPr>
-            <p:ph type="sldNum" sz="quarter" idx="12"/>
+            <p:ph type="sldNum" sz="quarter" idx="4"/>
           </p:nvPr>
         </p:nvSpPr>
-        <p:spPr/>
+        <p:spPr>
+          <a:xfrm>
+            <a:off x="11779044" y="6459794"/>
+            <a:ext cx="412956" cy="398206"/>
+          </a:xfrm>
+          <a:prstGeom prst="rect">
+            <a:avLst/>
+          </a:prstGeom>
+        </p:spPr>
         <p:txBody>
           <a:bodyPr/>
           <a:lstStyle/>
           <a:p>
             <a:fld id="{88051181-3DEF-484A-8434-F25831745C76}" type="slidenum">
               <a:rPr lang="de-DE" smtClean="0"/>
-              <a:t>15</a:t>
+              <a:t>14</a:t>
             </a:fld>
             <a:endParaRPr lang="de-DE"/>
           </a:p>
@@ -8518,17 +8617,25 @@
             <a:spLocks noGrp="1"/>
           </p:cNvSpPr>
           <p:nvPr>
-            <p:ph type="sldNum" sz="quarter" idx="12"/>
+            <p:ph type="sldNum" sz="quarter" idx="4"/>
           </p:nvPr>
         </p:nvSpPr>
-        <p:spPr/>
+        <p:spPr>
+          <a:xfrm>
+            <a:off x="11779044" y="6459794"/>
+            <a:ext cx="412956" cy="398206"/>
+          </a:xfrm>
+          <a:prstGeom prst="rect">
+            <a:avLst/>
+          </a:prstGeom>
+        </p:spPr>
         <p:txBody>
           <a:bodyPr/>
           <a:lstStyle/>
           <a:p>
             <a:fld id="{88051181-3DEF-484A-8434-F25831745C76}" type="slidenum">
               <a:rPr lang="de-DE" smtClean="0"/>
-              <a:t>16</a:t>
+              <a:t>15</a:t>
             </a:fld>
             <a:endParaRPr lang="de-DE"/>
           </a:p>
@@ -10531,17 +10638,25 @@
             <a:spLocks noGrp="1"/>
           </p:cNvSpPr>
           <p:nvPr>
-            <p:ph type="sldNum" sz="quarter" idx="12"/>
+            <p:ph type="sldNum" sz="quarter" idx="4"/>
           </p:nvPr>
         </p:nvSpPr>
-        <p:spPr/>
+        <p:spPr>
+          <a:xfrm>
+            <a:off x="11779044" y="6459794"/>
+            <a:ext cx="412956" cy="398206"/>
+          </a:xfrm>
+          <a:prstGeom prst="rect">
+            <a:avLst/>
+          </a:prstGeom>
+        </p:spPr>
         <p:txBody>
           <a:bodyPr/>
           <a:lstStyle/>
           <a:p>
             <a:fld id="{88051181-3DEF-484A-8434-F25831745C76}" type="slidenum">
               <a:rPr lang="de-DE" smtClean="0"/>
-              <a:t>17</a:t>
+              <a:t>16</a:t>
             </a:fld>
             <a:endParaRPr lang="de-DE"/>
           </a:p>
@@ -12603,17 +12718,25 @@
             <a:spLocks noGrp="1"/>
           </p:cNvSpPr>
           <p:nvPr>
-            <p:ph type="sldNum" sz="quarter" idx="12"/>
+            <p:ph type="sldNum" sz="quarter" idx="4"/>
           </p:nvPr>
         </p:nvSpPr>
-        <p:spPr/>
+        <p:spPr>
+          <a:xfrm>
+            <a:off x="11779044" y="6459794"/>
+            <a:ext cx="412956" cy="398206"/>
+          </a:xfrm>
+          <a:prstGeom prst="rect">
+            <a:avLst/>
+          </a:prstGeom>
+        </p:spPr>
         <p:txBody>
           <a:bodyPr/>
           <a:lstStyle/>
           <a:p>
             <a:fld id="{88051181-3DEF-484A-8434-F25831745C76}" type="slidenum">
               <a:rPr lang="de-DE" smtClean="0"/>
-              <a:t>18</a:t>
+              <a:t>17</a:t>
             </a:fld>
             <a:endParaRPr lang="de-DE"/>
           </a:p>
@@ -14898,17 +15021,25 @@
             <a:spLocks noGrp="1"/>
           </p:cNvSpPr>
           <p:nvPr>
-            <p:ph type="sldNum" sz="quarter" idx="12"/>
+            <p:ph type="sldNum" sz="quarter" idx="4"/>
           </p:nvPr>
         </p:nvSpPr>
-        <p:spPr/>
+        <p:spPr>
+          <a:xfrm>
+            <a:off x="11779044" y="6459794"/>
+            <a:ext cx="412956" cy="398206"/>
+          </a:xfrm>
+          <a:prstGeom prst="rect">
+            <a:avLst/>
+          </a:prstGeom>
+        </p:spPr>
         <p:txBody>
           <a:bodyPr/>
           <a:lstStyle/>
           <a:p>
             <a:fld id="{88051181-3DEF-484A-8434-F25831745C76}" type="slidenum">
               <a:rPr lang="de-DE" smtClean="0"/>
-              <a:t>19</a:t>
+              <a:t>18</a:t>
             </a:fld>
             <a:endParaRPr lang="de-DE"/>
           </a:p>
@@ -16912,17 +17043,25 @@
             <a:spLocks noGrp="1"/>
           </p:cNvSpPr>
           <p:nvPr>
-            <p:ph type="sldNum" sz="quarter" idx="12"/>
+            <p:ph type="sldNum" sz="quarter" idx="4"/>
           </p:nvPr>
         </p:nvSpPr>
-        <p:spPr/>
+        <p:spPr>
+          <a:xfrm>
+            <a:off x="11779044" y="6459794"/>
+            <a:ext cx="412956" cy="398206"/>
+          </a:xfrm>
+          <a:prstGeom prst="rect">
+            <a:avLst/>
+          </a:prstGeom>
+        </p:spPr>
         <p:txBody>
           <a:bodyPr/>
           <a:lstStyle/>
           <a:p>
             <a:fld id="{88051181-3DEF-484A-8434-F25831745C76}" type="slidenum">
               <a:rPr lang="de-DE" smtClean="0"/>
-              <a:t>2</a:t>
+              <a:t>1</a:t>
             </a:fld>
             <a:endParaRPr lang="de-DE"/>
           </a:p>
@@ -17891,10 +18030,18 @@
             <a:spLocks noGrp="1"/>
           </p:cNvSpPr>
           <p:nvPr>
-            <p:ph type="sldNum" sz="quarter" idx="12"/>
+            <p:ph type="sldNum" sz="quarter" idx="4"/>
           </p:nvPr>
         </p:nvSpPr>
-        <p:spPr/>
+        <p:spPr>
+          <a:xfrm>
+            <a:off x="11779044" y="6459794"/>
+            <a:ext cx="412956" cy="398206"/>
+          </a:xfrm>
+          <a:prstGeom prst="rect">
+            <a:avLst/>
+          </a:prstGeom>
+        </p:spPr>
         <p:txBody>
           <a:bodyPr/>
           <a:lstStyle/>
@@ -17902,7 +18049,7 @@
             <a:fld id="{88051181-3DEF-484A-8434-F25831745C76}" type="slidenum">
               <a:rPr lang="de-DE" smtClean="0"/>
               <a:pPr/>
-              <a:t>20</a:t>
+              <a:t>19</a:t>
             </a:fld>
             <a:endParaRPr lang="de-DE" dirty="0"/>
           </a:p>
@@ -18507,10 +18654,18 @@
             <a:spLocks noGrp="1"/>
           </p:cNvSpPr>
           <p:nvPr>
-            <p:ph type="sldNum" sz="quarter" idx="12"/>
+            <p:ph type="sldNum" sz="quarter" idx="4"/>
           </p:nvPr>
         </p:nvSpPr>
-        <p:spPr/>
+        <p:spPr>
+          <a:xfrm>
+            <a:off x="11779044" y="6459794"/>
+            <a:ext cx="412956" cy="398206"/>
+          </a:xfrm>
+          <a:prstGeom prst="rect">
+            <a:avLst/>
+          </a:prstGeom>
+        </p:spPr>
         <p:txBody>
           <a:bodyPr/>
           <a:lstStyle/>
@@ -18518,7 +18673,7 @@
             <a:fld id="{88051181-3DEF-484A-8434-F25831745C76}" type="slidenum">
               <a:rPr lang="de-DE" smtClean="0"/>
               <a:pPr/>
-              <a:t>21</a:t>
+              <a:t>20</a:t>
             </a:fld>
             <a:endParaRPr lang="de-DE" dirty="0"/>
           </a:p>
@@ -19246,10 +19401,18 @@
             <a:spLocks noGrp="1"/>
           </p:cNvSpPr>
           <p:nvPr>
-            <p:ph type="sldNum" sz="quarter" idx="12"/>
+            <p:ph type="sldNum" sz="quarter" idx="4"/>
           </p:nvPr>
         </p:nvSpPr>
-        <p:spPr/>
+        <p:spPr>
+          <a:xfrm>
+            <a:off x="11779044" y="6459794"/>
+            <a:ext cx="412956" cy="398206"/>
+          </a:xfrm>
+          <a:prstGeom prst="rect">
+            <a:avLst/>
+          </a:prstGeom>
+        </p:spPr>
         <p:txBody>
           <a:bodyPr/>
           <a:lstStyle/>
@@ -19257,7 +19420,7 @@
             <a:fld id="{88051181-3DEF-484A-8434-F25831745C76}" type="slidenum">
               <a:rPr lang="de-DE" smtClean="0"/>
               <a:pPr/>
-              <a:t>22</a:t>
+              <a:t>21</a:t>
             </a:fld>
             <a:endParaRPr lang="de-DE" dirty="0"/>
           </a:p>
@@ -20326,10 +20489,18 @@
             <a:spLocks noGrp="1"/>
           </p:cNvSpPr>
           <p:nvPr>
-            <p:ph type="sldNum" sz="quarter" idx="12"/>
+            <p:ph type="sldNum" sz="quarter" idx="4"/>
           </p:nvPr>
         </p:nvSpPr>
-        <p:spPr/>
+        <p:spPr>
+          <a:xfrm>
+            <a:off x="11779044" y="6459794"/>
+            <a:ext cx="412956" cy="398206"/>
+          </a:xfrm>
+          <a:prstGeom prst="rect">
+            <a:avLst/>
+          </a:prstGeom>
+        </p:spPr>
         <p:txBody>
           <a:bodyPr/>
           <a:lstStyle/>
@@ -20337,7 +20508,7 @@
             <a:fld id="{88051181-3DEF-484A-8434-F25831745C76}" type="slidenum">
               <a:rPr lang="de-DE" smtClean="0"/>
               <a:pPr/>
-              <a:t>23</a:t>
+              <a:t>22</a:t>
             </a:fld>
             <a:endParaRPr lang="de-DE" dirty="0"/>
           </a:p>
@@ -21750,10 +21921,18 @@
             <a:spLocks noGrp="1"/>
           </p:cNvSpPr>
           <p:nvPr>
-            <p:ph type="sldNum" sz="quarter" idx="12"/>
+            <p:ph type="sldNum" sz="quarter" idx="4"/>
           </p:nvPr>
         </p:nvSpPr>
-        <p:spPr/>
+        <p:spPr>
+          <a:xfrm>
+            <a:off x="11779044" y="6459794"/>
+            <a:ext cx="412956" cy="398206"/>
+          </a:xfrm>
+          <a:prstGeom prst="rect">
+            <a:avLst/>
+          </a:prstGeom>
+        </p:spPr>
         <p:txBody>
           <a:bodyPr/>
           <a:lstStyle/>
@@ -21761,7 +21940,7 @@
             <a:fld id="{88051181-3DEF-484A-8434-F25831745C76}" type="slidenum">
               <a:rPr lang="de-DE" smtClean="0"/>
               <a:pPr/>
-              <a:t>24</a:t>
+              <a:t>23</a:t>
             </a:fld>
             <a:endParaRPr lang="de-DE" dirty="0"/>
           </a:p>
@@ -23517,10 +23696,18 @@
             <a:spLocks noGrp="1"/>
           </p:cNvSpPr>
           <p:nvPr>
-            <p:ph type="sldNum" sz="quarter" idx="12"/>
+            <p:ph type="sldNum" sz="quarter" idx="4"/>
           </p:nvPr>
         </p:nvSpPr>
-        <p:spPr/>
+        <p:spPr>
+          <a:xfrm>
+            <a:off x="11779044" y="6459794"/>
+            <a:ext cx="412956" cy="398206"/>
+          </a:xfrm>
+          <a:prstGeom prst="rect">
+            <a:avLst/>
+          </a:prstGeom>
+        </p:spPr>
         <p:txBody>
           <a:bodyPr/>
           <a:lstStyle/>
@@ -23528,7 +23715,7 @@
             <a:fld id="{88051181-3DEF-484A-8434-F25831745C76}" type="slidenum">
               <a:rPr lang="de-DE" smtClean="0"/>
               <a:pPr/>
-              <a:t>25</a:t>
+              <a:t>24</a:t>
             </a:fld>
             <a:endParaRPr lang="de-DE" dirty="0"/>
           </a:p>
@@ -25657,10 +25844,18 @@
             <a:spLocks noGrp="1"/>
           </p:cNvSpPr>
           <p:nvPr>
-            <p:ph type="sldNum" sz="quarter" idx="12"/>
+            <p:ph type="sldNum" sz="quarter" idx="4"/>
           </p:nvPr>
         </p:nvSpPr>
-        <p:spPr/>
+        <p:spPr>
+          <a:xfrm>
+            <a:off x="11779044" y="6459794"/>
+            <a:ext cx="412956" cy="398206"/>
+          </a:xfrm>
+          <a:prstGeom prst="rect">
+            <a:avLst/>
+          </a:prstGeom>
+        </p:spPr>
         <p:txBody>
           <a:bodyPr/>
           <a:lstStyle/>
@@ -25668,7 +25863,7 @@
             <a:fld id="{88051181-3DEF-484A-8434-F25831745C76}" type="slidenum">
               <a:rPr lang="de-DE" smtClean="0"/>
               <a:pPr/>
-              <a:t>26</a:t>
+              <a:t>25</a:t>
             </a:fld>
             <a:endParaRPr lang="de-DE" dirty="0"/>
           </a:p>
@@ -28122,10 +28317,18 @@
             <a:spLocks noGrp="1"/>
           </p:cNvSpPr>
           <p:nvPr>
-            <p:ph type="sldNum" sz="quarter" idx="12"/>
+            <p:ph type="sldNum" sz="quarter" idx="4"/>
           </p:nvPr>
         </p:nvSpPr>
-        <p:spPr/>
+        <p:spPr>
+          <a:xfrm>
+            <a:off x="11779044" y="6459794"/>
+            <a:ext cx="412956" cy="398206"/>
+          </a:xfrm>
+          <a:prstGeom prst="rect">
+            <a:avLst/>
+          </a:prstGeom>
+        </p:spPr>
         <p:txBody>
           <a:bodyPr/>
           <a:lstStyle/>
@@ -28133,7 +28336,7 @@
             <a:fld id="{88051181-3DEF-484A-8434-F25831745C76}" type="slidenum">
               <a:rPr lang="de-DE" smtClean="0"/>
               <a:pPr/>
-              <a:t>27</a:t>
+              <a:t>26</a:t>
             </a:fld>
             <a:endParaRPr lang="de-DE" dirty="0"/>
           </a:p>
@@ -30930,17 +31133,25 @@
             <a:spLocks noGrp="1"/>
           </p:cNvSpPr>
           <p:nvPr>
-            <p:ph type="sldNum" sz="quarter" idx="12"/>
+            <p:ph type="sldNum" sz="quarter" idx="4"/>
           </p:nvPr>
         </p:nvSpPr>
-        <p:spPr/>
+        <p:spPr>
+          <a:xfrm>
+            <a:off x="11779044" y="6459794"/>
+            <a:ext cx="412956" cy="398206"/>
+          </a:xfrm>
+          <a:prstGeom prst="rect">
+            <a:avLst/>
+          </a:prstGeom>
+        </p:spPr>
         <p:txBody>
           <a:bodyPr/>
           <a:lstStyle/>
           <a:p>
             <a:fld id="{88051181-3DEF-484A-8434-F25831745C76}" type="slidenum">
               <a:rPr lang="de-DE" smtClean="0"/>
-              <a:t>28</a:t>
+              <a:t>27</a:t>
             </a:fld>
             <a:endParaRPr lang="de-DE"/>
           </a:p>
@@ -31914,17 +32125,25 @@
             <a:spLocks noGrp="1"/>
           </p:cNvSpPr>
           <p:nvPr>
-            <p:ph type="sldNum" sz="quarter" idx="12"/>
+            <p:ph type="sldNum" sz="quarter" idx="4"/>
           </p:nvPr>
         </p:nvSpPr>
-        <p:spPr/>
+        <p:spPr>
+          <a:xfrm>
+            <a:off x="11779044" y="6459794"/>
+            <a:ext cx="412956" cy="398206"/>
+          </a:xfrm>
+          <a:prstGeom prst="rect">
+            <a:avLst/>
+          </a:prstGeom>
+        </p:spPr>
         <p:txBody>
           <a:bodyPr/>
           <a:lstStyle/>
           <a:p>
             <a:fld id="{88051181-3DEF-484A-8434-F25831745C76}" type="slidenum">
               <a:rPr lang="de-DE" smtClean="0"/>
-              <a:t>29</a:t>
+              <a:t>28</a:t>
             </a:fld>
             <a:endParaRPr lang="de-DE"/>
           </a:p>
@@ -32890,10 +33109,18 @@
             <a:spLocks noGrp="1"/>
           </p:cNvSpPr>
           <p:nvPr>
-            <p:ph type="sldNum" sz="quarter" idx="12"/>
+            <p:ph type="sldNum" sz="quarter" idx="4"/>
           </p:nvPr>
         </p:nvSpPr>
-        <p:spPr/>
+        <p:spPr>
+          <a:xfrm>
+            <a:off x="11779044" y="6459794"/>
+            <a:ext cx="412956" cy="398206"/>
+          </a:xfrm>
+          <a:prstGeom prst="rect">
+            <a:avLst/>
+          </a:prstGeom>
+        </p:spPr>
         <p:txBody>
           <a:bodyPr/>
           <a:lstStyle/>
@@ -32901,7 +33128,7 @@
             <a:fld id="{88051181-3DEF-484A-8434-F25831745C76}" type="slidenum">
               <a:rPr lang="de-DE" smtClean="0"/>
               <a:pPr/>
-              <a:t>3</a:t>
+              <a:t>2</a:t>
             </a:fld>
             <a:endParaRPr lang="de-DE" dirty="0"/>
           </a:p>
@@ -34521,10 +34748,18 @@
             <a:spLocks noGrp="1"/>
           </p:cNvSpPr>
           <p:nvPr>
-            <p:ph type="sldNum" sz="quarter" idx="12"/>
+            <p:ph type="sldNum" sz="quarter" idx="4"/>
           </p:nvPr>
         </p:nvSpPr>
-        <p:spPr/>
+        <p:spPr>
+          <a:xfrm>
+            <a:off x="11779044" y="6459794"/>
+            <a:ext cx="412956" cy="398206"/>
+          </a:xfrm>
+          <a:prstGeom prst="rect">
+            <a:avLst/>
+          </a:prstGeom>
+        </p:spPr>
         <p:txBody>
           <a:bodyPr/>
           <a:lstStyle/>
@@ -34532,7 +34767,7 @@
             <a:fld id="{88051181-3DEF-484A-8434-F25831745C76}" type="slidenum">
               <a:rPr lang="de-DE" smtClean="0"/>
               <a:pPr/>
-              <a:t>30</a:t>
+              <a:t>29</a:t>
             </a:fld>
             <a:endParaRPr lang="de-DE" dirty="0"/>
           </a:p>
@@ -38972,10 +39207,18 @@
             <a:spLocks noGrp="1"/>
           </p:cNvSpPr>
           <p:nvPr>
-            <p:ph type="sldNum" sz="quarter" idx="12"/>
+            <p:ph type="sldNum" sz="quarter" idx="4"/>
           </p:nvPr>
         </p:nvSpPr>
-        <p:spPr/>
+        <p:spPr>
+          <a:xfrm>
+            <a:off x="11779044" y="6459794"/>
+            <a:ext cx="412956" cy="398206"/>
+          </a:xfrm>
+          <a:prstGeom prst="rect">
+            <a:avLst/>
+          </a:prstGeom>
+        </p:spPr>
         <p:txBody>
           <a:bodyPr/>
           <a:lstStyle/>
@@ -38983,7 +39226,7 @@
             <a:fld id="{88051181-3DEF-484A-8434-F25831745C76}" type="slidenum">
               <a:rPr lang="de-DE" smtClean="0"/>
               <a:pPr/>
-              <a:t>31</a:t>
+              <a:t>30</a:t>
             </a:fld>
             <a:endParaRPr lang="de-DE" dirty="0"/>
           </a:p>
@@ -40559,17 +40802,25 @@
             <a:spLocks noGrp="1"/>
           </p:cNvSpPr>
           <p:nvPr>
-            <p:ph type="sldNum" sz="quarter" idx="12"/>
+            <p:ph type="sldNum" sz="quarter" idx="4"/>
           </p:nvPr>
         </p:nvSpPr>
-        <p:spPr/>
+        <p:spPr>
+          <a:xfrm>
+            <a:off x="11779044" y="6459794"/>
+            <a:ext cx="412956" cy="398206"/>
+          </a:xfrm>
+          <a:prstGeom prst="rect">
+            <a:avLst/>
+          </a:prstGeom>
+        </p:spPr>
         <p:txBody>
           <a:bodyPr/>
           <a:lstStyle/>
           <a:p>
             <a:fld id="{88051181-3DEF-484A-8434-F25831745C76}" type="slidenum">
               <a:rPr lang="de-DE" smtClean="0"/>
-              <a:t>4</a:t>
+              <a:t>3</a:t>
             </a:fld>
             <a:endParaRPr lang="de-DE"/>
           </a:p>
@@ -41543,17 +41794,25 @@
             <a:spLocks noGrp="1"/>
           </p:cNvSpPr>
           <p:nvPr>
-            <p:ph type="sldNum" sz="quarter" idx="12"/>
+            <p:ph type="sldNum" sz="quarter" idx="4"/>
           </p:nvPr>
         </p:nvSpPr>
-        <p:spPr/>
+        <p:spPr>
+          <a:xfrm>
+            <a:off x="11779044" y="6459794"/>
+            <a:ext cx="412956" cy="398206"/>
+          </a:xfrm>
+          <a:prstGeom prst="rect">
+            <a:avLst/>
+          </a:prstGeom>
+        </p:spPr>
         <p:txBody>
           <a:bodyPr/>
           <a:lstStyle/>
           <a:p>
             <a:fld id="{88051181-3DEF-484A-8434-F25831745C76}" type="slidenum">
               <a:rPr lang="de-DE" smtClean="0"/>
-              <a:t>5</a:t>
+              <a:t>4</a:t>
             </a:fld>
             <a:endParaRPr lang="de-DE"/>
           </a:p>
@@ -43543,17 +43802,25 @@
             <a:spLocks noGrp="1"/>
           </p:cNvSpPr>
           <p:nvPr>
-            <p:ph type="sldNum" sz="quarter" idx="12"/>
+            <p:ph type="sldNum" sz="quarter" idx="4"/>
           </p:nvPr>
         </p:nvSpPr>
-        <p:spPr/>
+        <p:spPr>
+          <a:xfrm>
+            <a:off x="11779044" y="6459794"/>
+            <a:ext cx="412956" cy="398206"/>
+          </a:xfrm>
+          <a:prstGeom prst="rect">
+            <a:avLst/>
+          </a:prstGeom>
+        </p:spPr>
         <p:txBody>
           <a:bodyPr/>
           <a:lstStyle/>
           <a:p>
             <a:fld id="{88051181-3DEF-484A-8434-F25831745C76}" type="slidenum">
               <a:rPr lang="de-DE" smtClean="0"/>
-              <a:t>6</a:t>
+              <a:t>5</a:t>
             </a:fld>
             <a:endParaRPr lang="de-DE"/>
           </a:p>
@@ -44511,10 +44778,18 @@
             <a:spLocks noGrp="1"/>
           </p:cNvSpPr>
           <p:nvPr>
-            <p:ph type="sldNum" sz="quarter" idx="12"/>
+            <p:ph type="sldNum" sz="quarter" idx="4"/>
           </p:nvPr>
         </p:nvSpPr>
-        <p:spPr/>
+        <p:spPr>
+          <a:xfrm>
+            <a:off x="11769212" y="6459794"/>
+            <a:ext cx="422787" cy="398206"/>
+          </a:xfrm>
+          <a:prstGeom prst="rect">
+            <a:avLst/>
+          </a:prstGeom>
+        </p:spPr>
         <p:txBody>
           <a:bodyPr/>
           <a:lstStyle/>
@@ -44522,7 +44797,7 @@
             <a:fld id="{88051181-3DEF-484A-8434-F25831745C76}" type="slidenum">
               <a:rPr lang="de-DE" smtClean="0"/>
               <a:pPr/>
-              <a:t>7</a:t>
+              <a:t>6</a:t>
             </a:fld>
             <a:endParaRPr lang="de-DE" dirty="0"/>
           </a:p>
@@ -45902,7 +46177,47 @@
             </a:pPr>
             <a:r>
               <a:rPr lang="de-DE" sz="1400" dirty="0" smtClean="0"/>
-              <a:t>Synthetische Marker an vorgegebenen Stellen</a:t>
+              <a:t>Synthetische Marker an vorgegebenen Stellen erkennen</a:t>
+            </a:r>
+          </a:p>
+          <a:p>
+            <a:pPr marL="252000" indent="-180000" eaLnBrk="0" hangingPunct="0">
+              <a:spcBef>
+                <a:spcPts val="200"/>
+              </a:spcBef>
+              <a:spcAft>
+                <a:spcPts val="200"/>
+              </a:spcAft>
+              <a:buClr>
+                <a:srgbClr val="007348"/>
+              </a:buClr>
+              <a:buFont typeface="Wingdings" pitchFamily="2" charset="2"/>
+              <a:buChar char="§"/>
+              <a:defRPr/>
+            </a:pPr>
+            <a:r>
+              <a:rPr lang="de-DE" sz="1400" dirty="0" smtClean="0"/>
+              <a:t>Konvertieren in Welt Koordinaten</a:t>
+            </a:r>
+          </a:p>
+          <a:p>
+            <a:pPr marL="252000" indent="-180000" eaLnBrk="0" hangingPunct="0">
+              <a:spcBef>
+                <a:spcPts val="200"/>
+              </a:spcBef>
+              <a:spcAft>
+                <a:spcPts val="200"/>
+              </a:spcAft>
+              <a:buClr>
+                <a:srgbClr val="007348"/>
+              </a:buClr>
+              <a:buFont typeface="Wingdings" pitchFamily="2" charset="2"/>
+              <a:buChar char="§"/>
+              <a:defRPr/>
+            </a:pPr>
+            <a:r>
+              <a:rPr lang="de-DE" sz="1400" dirty="0" smtClean="0"/>
+              <a:t>Daten veröffentlichen</a:t>
             </a:r>
             <a:endParaRPr lang="de-DE" sz="1400" dirty="0"/>
           </a:p>
@@ -46420,10 +46735,18 @@
             <a:spLocks noGrp="1"/>
           </p:cNvSpPr>
           <p:nvPr>
-            <p:ph type="sldNum" sz="quarter" idx="12"/>
+            <p:ph type="sldNum" sz="quarter" idx="4"/>
           </p:nvPr>
         </p:nvSpPr>
-        <p:spPr/>
+        <p:spPr>
+          <a:xfrm>
+            <a:off x="11769212" y="6459794"/>
+            <a:ext cx="422787" cy="398206"/>
+          </a:xfrm>
+          <a:prstGeom prst="rect">
+            <a:avLst/>
+          </a:prstGeom>
+        </p:spPr>
         <p:txBody>
           <a:bodyPr/>
           <a:lstStyle/>
@@ -46431,7 +46754,7 @@
             <a:fld id="{88051181-3DEF-484A-8434-F25831745C76}" type="slidenum">
               <a:rPr lang="de-DE" smtClean="0"/>
               <a:pPr/>
-              <a:t>8</a:t>
+              <a:t>7</a:t>
             </a:fld>
             <a:endParaRPr lang="de-DE" dirty="0"/>
           </a:p>
@@ -48308,16 +48631,39 @@
           <a:lstStyle/>
           <a:p>
             <a:r>
-              <a:rPr lang="de-DE" dirty="0" smtClean="0"/>
+              <a:rPr lang="de-DE" dirty="0"/>
               <a:t>Das Vision Modul ist durch eine Vielzahl von Topics mit den anderen Gruppen verbunden</a:t>
             </a:r>
+          </a:p>
+        </p:txBody>
+      </p:sp>
+      <p:sp>
+        <p:nvSpPr>
+          <p:cNvPr id="3" name="Foliennummernplatzhalter 2"/>
+          <p:cNvSpPr>
+            <a:spLocks noGrp="1"/>
+          </p:cNvSpPr>
+          <p:nvPr>
+            <p:ph type="sldNum" sz="quarter" idx="4"/>
+          </p:nvPr>
+        </p:nvSpPr>
+        <p:spPr/>
+        <p:txBody>
+          <a:bodyPr/>
+          <a:lstStyle/>
+          <a:p>
+            <a:fld id="{5F169D08-9325-4915-9F9B-D4854A2E2446}" type="slidenum">
+              <a:rPr lang="de-DE" smtClean="0"/>
+              <a:pPr/>
+              <a:t>8</a:t>
+            </a:fld>
             <a:endParaRPr lang="de-DE" dirty="0"/>
           </a:p>
         </p:txBody>
       </p:sp>
       <p:sp>
         <p:nvSpPr>
-          <p:cNvPr id="3" name="AutoShape 4"/>
+          <p:cNvPr id="4" name="AutoShape 4"/>
           <p:cNvSpPr>
             <a:spLocks noChangeArrowheads="1"/>
           </p:cNvSpPr>
@@ -48563,7 +48909,7 @@
       </p:sp>
       <p:sp>
         <p:nvSpPr>
-          <p:cNvPr id="4" name="AutoShape 5"/>
+          <p:cNvPr id="5" name="AutoShape 5"/>
           <p:cNvSpPr>
             <a:spLocks noChangeArrowheads="1"/>
           </p:cNvSpPr>
@@ -48786,7 +49132,7 @@
       </p:sp>
       <p:sp>
         <p:nvSpPr>
-          <p:cNvPr id="5" name="Rectangle 6"/>
+          <p:cNvPr id="6" name="Rectangle 6"/>
           <p:cNvSpPr>
             <a:spLocks noChangeArrowheads="1"/>
           </p:cNvSpPr>
@@ -48963,7 +49309,7 @@
       </p:sp>
       <p:sp>
         <p:nvSpPr>
-          <p:cNvPr id="6" name="Rectangle 7"/>
+          <p:cNvPr id="7" name="Rectangle 7"/>
           <p:cNvSpPr>
             <a:spLocks noChangeArrowheads="1"/>
           </p:cNvSpPr>
@@ -49141,20 +49487,13 @@
     </p:spTree>
     <p:extLst>
       <p:ext uri="{BB962C8B-B14F-4D97-AF65-F5344CB8AC3E}">
-        <p14:creationId xmlns:p14="http://schemas.microsoft.com/office/powerpoint/2010/main" val="2555787152"/>
+        <p14:creationId xmlns:p14="http://schemas.microsoft.com/office/powerpoint/2010/main" val="2009662725"/>
       </p:ext>
     </p:extLst>
   </p:cSld>
   <p:clrMapOvr>
     <a:masterClrMapping/>
   </p:clrMapOvr>
-  <p:timing>
-    <p:tnLst>
-      <p:par>
-        <p:cTn id="1" dur="indefinite" restart="never" nodeType="tmRoot"/>
-      </p:par>
-    </p:tnLst>
-  </p:timing>
 </p:sld>
 </file>
 

</xml_diff>